<commit_message>
Updated redcap-etl dependency to 2.2.0
</commit_message>
<xml_diff>
--- a/dependencies/iu-redcap/redcap-etl/docs/REDCap-ETL-Configuration-Guide-Diagrams.pptx
+++ b/dependencies/iu-redcap/redcap-etl/docs/REDCap-ETL-Configuration-Guide-Diagrams.pptx
@@ -198,7 +198,7 @@
           <a:p>
             <a:fld id="{7D850D39-6E52-475F-B493-BC6A01EEF9C7}" type="datetimeFigureOut">
               <a:rPr lang="en-US" smtClean="0"/>
-              <a:t>11/9/2020</a:t>
+              <a:t>6/15/2022</a:t>
             </a:fld>
             <a:endParaRPr lang="en-US"/>
           </a:p>
@@ -511,7 +511,7 @@
           <a:p>
             <a:r>
               <a:rPr lang="en-US" dirty="0"/>
-              <a:t>To extract as image: select all objects, right-click, and copy. Paste into Word as an image, and resize to a width of 4.5 inches.  Then, in Word, right-click on image, and select “Save as Picture…”. Save as a .</a:t>
+              <a:t>To extract as image: select all objects, right-click, and copy. Paste into Word as an image, and it resize to a width of 4.5 inches.  Then, in Word, right-click on image, and select “Save as Picture…”. Save as a .</a:t>
             </a:r>
             <a:r>
               <a:rPr lang="en-US" dirty="0" err="1"/>
@@ -822,7 +822,7 @@
           <a:p>
             <a:fld id="{3891AD4C-6110-4E3E-ABB7-B60795A9E103}" type="datetimeFigureOut">
               <a:rPr lang="en-US" smtClean="0"/>
-              <a:t>11/9/2020</a:t>
+              <a:t>6/15/2022</a:t>
             </a:fld>
             <a:endParaRPr lang="en-US"/>
           </a:p>
@@ -1020,7 +1020,7 @@
           <a:p>
             <a:fld id="{3891AD4C-6110-4E3E-ABB7-B60795A9E103}" type="datetimeFigureOut">
               <a:rPr lang="en-US" smtClean="0"/>
-              <a:t>11/9/2020</a:t>
+              <a:t>6/15/2022</a:t>
             </a:fld>
             <a:endParaRPr lang="en-US"/>
           </a:p>
@@ -1228,7 +1228,7 @@
           <a:p>
             <a:fld id="{3891AD4C-6110-4E3E-ABB7-B60795A9E103}" type="datetimeFigureOut">
               <a:rPr lang="en-US" smtClean="0"/>
-              <a:t>11/9/2020</a:t>
+              <a:t>6/15/2022</a:t>
             </a:fld>
             <a:endParaRPr lang="en-US"/>
           </a:p>
@@ -1426,7 +1426,7 @@
           <a:p>
             <a:fld id="{3891AD4C-6110-4E3E-ABB7-B60795A9E103}" type="datetimeFigureOut">
               <a:rPr lang="en-US" smtClean="0"/>
-              <a:t>11/9/2020</a:t>
+              <a:t>6/15/2022</a:t>
             </a:fld>
             <a:endParaRPr lang="en-US"/>
           </a:p>
@@ -1701,7 +1701,7 @@
           <a:p>
             <a:fld id="{3891AD4C-6110-4E3E-ABB7-B60795A9E103}" type="datetimeFigureOut">
               <a:rPr lang="en-US" smtClean="0"/>
-              <a:t>11/9/2020</a:t>
+              <a:t>6/15/2022</a:t>
             </a:fld>
             <a:endParaRPr lang="en-US"/>
           </a:p>
@@ -1966,7 +1966,7 @@
           <a:p>
             <a:fld id="{3891AD4C-6110-4E3E-ABB7-B60795A9E103}" type="datetimeFigureOut">
               <a:rPr lang="en-US" smtClean="0"/>
-              <a:t>11/9/2020</a:t>
+              <a:t>6/15/2022</a:t>
             </a:fld>
             <a:endParaRPr lang="en-US"/>
           </a:p>
@@ -2378,7 +2378,7 @@
           <a:p>
             <a:fld id="{3891AD4C-6110-4E3E-ABB7-B60795A9E103}" type="datetimeFigureOut">
               <a:rPr lang="en-US" smtClean="0"/>
-              <a:t>11/9/2020</a:t>
+              <a:t>6/15/2022</a:t>
             </a:fld>
             <a:endParaRPr lang="en-US"/>
           </a:p>
@@ -2519,7 +2519,7 @@
           <a:p>
             <a:fld id="{3891AD4C-6110-4E3E-ABB7-B60795A9E103}" type="datetimeFigureOut">
               <a:rPr lang="en-US" smtClean="0"/>
-              <a:t>11/9/2020</a:t>
+              <a:t>6/15/2022</a:t>
             </a:fld>
             <a:endParaRPr lang="en-US"/>
           </a:p>
@@ -2632,7 +2632,7 @@
           <a:p>
             <a:fld id="{3891AD4C-6110-4E3E-ABB7-B60795A9E103}" type="datetimeFigureOut">
               <a:rPr lang="en-US" smtClean="0"/>
-              <a:t>11/9/2020</a:t>
+              <a:t>6/15/2022</a:t>
             </a:fld>
             <a:endParaRPr lang="en-US"/>
           </a:p>
@@ -2943,7 +2943,7 @@
           <a:p>
             <a:fld id="{3891AD4C-6110-4E3E-ABB7-B60795A9E103}" type="datetimeFigureOut">
               <a:rPr lang="en-US" smtClean="0"/>
-              <a:t>11/9/2020</a:t>
+              <a:t>6/15/2022</a:t>
             </a:fld>
             <a:endParaRPr lang="en-US"/>
           </a:p>
@@ -3231,7 +3231,7 @@
           <a:p>
             <a:fld id="{3891AD4C-6110-4E3E-ABB7-B60795A9E103}" type="datetimeFigureOut">
               <a:rPr lang="en-US" smtClean="0"/>
-              <a:t>11/9/2020</a:t>
+              <a:t>6/15/2022</a:t>
             </a:fld>
             <a:endParaRPr lang="en-US"/>
           </a:p>
@@ -3472,7 +3472,7 @@
           <a:p>
             <a:fld id="{3891AD4C-6110-4E3E-ABB7-B60795A9E103}" type="datetimeFigureOut">
               <a:rPr lang="en-US" smtClean="0"/>
-              <a:t>11/9/2020</a:t>
+              <a:t>6/15/2022</a:t>
             </a:fld>
             <a:endParaRPr lang="en-US"/>
           </a:p>
@@ -4004,7 +4004,7 @@
         </p:nvSpPr>
         <p:spPr>
           <a:xfrm>
-            <a:off x="1420800" y="1976802"/>
+            <a:off x="792150" y="1976802"/>
             <a:ext cx="1643063" cy="1169170"/>
           </a:xfrm>
           <a:prstGeom prst="roundRect">
@@ -4094,7 +4094,7 @@
         </p:nvSpPr>
         <p:spPr>
           <a:xfrm>
-            <a:off x="1768435" y="2498586"/>
+            <a:off x="1139785" y="2498586"/>
             <a:ext cx="945319" cy="377964"/>
           </a:xfrm>
           <a:prstGeom prst="rect">
@@ -4246,8 +4246,8 @@
         </p:nvCxnSpPr>
         <p:spPr>
           <a:xfrm>
-            <a:off x="2713754" y="2687568"/>
-            <a:ext cx="1818656" cy="5012"/>
+            <a:off x="2085104" y="2687568"/>
+            <a:ext cx="2447306" cy="5012"/>
           </a:xfrm>
           <a:prstGeom prst="straightConnector1">
             <a:avLst/>
@@ -4397,7 +4397,7 @@
         </p:nvSpPr>
         <p:spPr>
           <a:xfrm>
-            <a:off x="4659408" y="2089531"/>
+            <a:off x="4773708" y="2089531"/>
             <a:ext cx="1050878" cy="770048"/>
           </a:xfrm>
           <a:prstGeom prst="rect">
@@ -4715,8 +4715,8 @@
         </p:nvCxnSpPr>
         <p:spPr>
           <a:xfrm flipV="1">
-            <a:off x="5710286" y="1942798"/>
-            <a:ext cx="809592" cy="531757"/>
+            <a:off x="5824586" y="1942798"/>
+            <a:ext cx="695292" cy="531757"/>
           </a:xfrm>
           <a:prstGeom prst="straightConnector1">
             <a:avLst/>
@@ -4753,8 +4753,8 @@
         </p:nvCxnSpPr>
         <p:spPr>
           <a:xfrm>
-            <a:off x="5710286" y="2474555"/>
-            <a:ext cx="743983" cy="120130"/>
+            <a:off x="5824586" y="2474555"/>
+            <a:ext cx="629683" cy="120130"/>
           </a:xfrm>
           <a:prstGeom prst="straightConnector1">
             <a:avLst/>
@@ -4791,8 +4791,8 @@
         </p:nvCxnSpPr>
         <p:spPr>
           <a:xfrm>
-            <a:off x="5710286" y="2474555"/>
-            <a:ext cx="809592" cy="678598"/>
+            <a:off x="5824586" y="2474555"/>
+            <a:ext cx="695292" cy="678598"/>
           </a:xfrm>
           <a:prstGeom prst="straightConnector1">
             <a:avLst/>
@@ -4827,8 +4827,8 @@
         </p:nvSpPr>
         <p:spPr>
           <a:xfrm>
-            <a:off x="2617887" y="4676775"/>
-            <a:ext cx="6611837" cy="1361436"/>
+            <a:off x="891540" y="4693613"/>
+            <a:ext cx="8364171" cy="1361436"/>
           </a:xfrm>
           <a:prstGeom prst="roundRect">
             <a:avLst/>
@@ -4898,7 +4898,7 @@
         </p:nvSpPr>
         <p:spPr>
           <a:xfrm>
-            <a:off x="2809876" y="4909055"/>
+            <a:off x="1130332" y="4888398"/>
             <a:ext cx="1952625" cy="641664"/>
           </a:xfrm>
           <a:prstGeom prst="rect">
@@ -4991,7 +4991,7 @@
         </p:nvSpPr>
         <p:spPr>
           <a:xfrm>
-            <a:off x="4935440" y="4909055"/>
+            <a:off x="4935330" y="4909055"/>
             <a:ext cx="1952625" cy="620774"/>
           </a:xfrm>
           <a:prstGeom prst="rect">
@@ -5054,7 +5054,7 @@
         </p:nvSpPr>
         <p:spPr>
           <a:xfrm>
-            <a:off x="7061004" y="4909054"/>
+            <a:off x="7065754" y="4909054"/>
             <a:ext cx="1952625" cy="620775"/>
           </a:xfrm>
           <a:prstGeom prst="rect">
@@ -5119,8 +5119,8 @@
         </p:nvCxnSpPr>
         <p:spPr>
           <a:xfrm>
-            <a:off x="2241095" y="2876550"/>
-            <a:ext cx="1545094" cy="2032505"/>
+            <a:off x="1612445" y="2876550"/>
+            <a:ext cx="494200" cy="2011848"/>
           </a:xfrm>
           <a:prstGeom prst="line">
             <a:avLst/>
@@ -5168,7 +5168,7 @@
         <p:spPr>
           <a:xfrm>
             <a:off x="5878610" y="3810000"/>
-            <a:ext cx="33143" cy="1099055"/>
+            <a:ext cx="33033" cy="1099055"/>
           </a:xfrm>
           <a:prstGeom prst="line">
             <a:avLst/>
@@ -5215,8 +5215,8 @@
         </p:nvCxnSpPr>
         <p:spPr>
           <a:xfrm flipH="1">
-            <a:off x="8037317" y="3205452"/>
-            <a:ext cx="1622523" cy="1703602"/>
+            <a:off x="8042067" y="3205452"/>
+            <a:ext cx="1617773" cy="1703602"/>
           </a:xfrm>
           <a:prstGeom prst="line">
             <a:avLst/>
@@ -5315,6 +5315,124 @@
           </a:p>
         </p:txBody>
       </p:sp>
+      <p:sp>
+        <p:nvSpPr>
+          <p:cNvPr id="25" name="Rectangle 24">
+            <a:extLst>
+              <a:ext uri="{FF2B5EF4-FFF2-40B4-BE49-F238E27FC236}">
+                <a16:creationId xmlns:a16="http://schemas.microsoft.com/office/drawing/2014/main" id="{32A7E27C-DA30-4B9C-87FD-FFB5FD8DA80F}"/>
+              </a:ext>
+            </a:extLst>
+          </p:cNvPr>
+          <p:cNvSpPr>
+            <a:spLocks noChangeAspect="1"/>
+          </p:cNvSpPr>
+          <p:nvPr/>
+        </p:nvSpPr>
+        <p:spPr>
+          <a:xfrm>
+            <a:off x="3260756" y="4891778"/>
+            <a:ext cx="1496775" cy="641664"/>
+          </a:xfrm>
+          <a:prstGeom prst="rect">
+            <a:avLst/>
+          </a:prstGeom>
+          <a:solidFill>
+            <a:schemeClr val="accent6">
+              <a:lumMod val="40000"/>
+              <a:lumOff val="60000"/>
+            </a:schemeClr>
+          </a:solidFill>
+          <a:ln>
+            <a:solidFill>
+              <a:schemeClr val="accent6">
+                <a:lumMod val="75000"/>
+              </a:schemeClr>
+            </a:solidFill>
+          </a:ln>
+        </p:spPr>
+        <p:style>
+          <a:lnRef idx="2">
+            <a:schemeClr val="accent1">
+              <a:shade val="50000"/>
+            </a:schemeClr>
+          </a:lnRef>
+          <a:fillRef idx="1">
+            <a:schemeClr val="accent1"/>
+          </a:fillRef>
+          <a:effectRef idx="0">
+            <a:schemeClr val="accent1"/>
+          </a:effectRef>
+          <a:fontRef idx="minor">
+            <a:schemeClr val="lt1"/>
+          </a:fontRef>
+        </p:style>
+        <p:txBody>
+          <a:bodyPr rtlCol="0" anchor="ctr"/>
+          <a:lstStyle/>
+          <a:p>
+            <a:pPr algn="ctr"/>
+            <a:r>
+              <a:rPr lang="en-US" dirty="0">
+                <a:solidFill>
+                  <a:schemeClr val="accent6">
+                    <a:lumMod val="50000"/>
+                  </a:schemeClr>
+                </a:solidFill>
+              </a:rPr>
+              <a:t>Extract Filter Logic</a:t>
+            </a:r>
+          </a:p>
+        </p:txBody>
+      </p:sp>
+      <p:cxnSp>
+        <p:nvCxnSpPr>
+          <p:cNvPr id="30" name="Straight Connector 29">
+            <a:extLst>
+              <a:ext uri="{FF2B5EF4-FFF2-40B4-BE49-F238E27FC236}">
+                <a16:creationId xmlns:a16="http://schemas.microsoft.com/office/drawing/2014/main" id="{8035BCF7-88E6-418C-8074-07CED4F04AD0}"/>
+              </a:ext>
+            </a:extLst>
+          </p:cNvPr>
+          <p:cNvCxnSpPr>
+            <a:cxnSpLocks noChangeAspect="1"/>
+            <a:stCxn id="99" idx="2"/>
+            <a:endCxn id="25" idx="0"/>
+          </p:cNvCxnSpPr>
+          <p:nvPr/>
+        </p:nvCxnSpPr>
+        <p:spPr>
+          <a:xfrm>
+            <a:off x="3519261" y="2719286"/>
+            <a:ext cx="489883" cy="2172492"/>
+          </a:xfrm>
+          <a:prstGeom prst="line">
+            <a:avLst/>
+          </a:prstGeom>
+          <a:ln w="15875">
+            <a:solidFill>
+              <a:schemeClr val="accent6">
+                <a:lumMod val="75000"/>
+              </a:schemeClr>
+            </a:solidFill>
+            <a:prstDash val="dash"/>
+          </a:ln>
+        </p:spPr>
+        <p:style>
+          <a:lnRef idx="1">
+            <a:schemeClr val="accent1"/>
+          </a:lnRef>
+          <a:fillRef idx="0">
+            <a:schemeClr val="accent1"/>
+          </a:fillRef>
+          <a:effectRef idx="0">
+            <a:schemeClr val="accent1"/>
+          </a:effectRef>
+          <a:fontRef idx="minor">
+            <a:schemeClr val="tx1"/>
+          </a:fontRef>
+        </p:style>
+      </p:cxnSp>
     </p:spTree>
     <p:extLst>
       <p:ext uri="{BB962C8B-B14F-4D97-AF65-F5344CB8AC3E}">

</xml_diff>